<commit_message>
Put what I leanred
I will work on json slides later tonight
</commit_message>
<xml_diff>
--- a/Briefings/WinterFinalBriefing.pptx
+++ b/Briefings/WinterFinalBriefing.pptx
@@ -122,6 +122,22 @@
       </a:defRPr>
     </a:lvl9pPr>
   </p:defaultTextStyle>
+  <p:extLst>
+    <p:ext uri="{EFAFB233-063F-42B5-8137-9DF3F51BA10A}">
+      <p15:sldGuideLst xmlns:p15="http://schemas.microsoft.com/office/powerpoint/2012/main">
+        <p15:guide id="1" orient="horz" pos="2160">
+          <p15:clr>
+            <a:srgbClr val="A4A3A4"/>
+          </p15:clr>
+        </p15:guide>
+        <p15:guide id="2" pos="2880">
+          <p15:clr>
+            <a:srgbClr val="A4A3A4"/>
+          </p15:clr>
+        </p15:guide>
+      </p15:sldGuideLst>
+    </p:ext>
+  </p:extLst>
 </p:presentation>
 </file>
 
@@ -4314,7 +4330,7 @@
           <a:bodyPr/>
           <a:lstStyle/>
           <a:p>
-            <a:endParaRPr lang="en-US"/>
+            <a:endParaRPr lang="en-US" dirty="0"/>
           </a:p>
         </p:txBody>
       </p:sp>
@@ -4769,7 +4785,51 @@
               <a:rPr lang="en-US" dirty="0" smtClean="0"/>
               <a:t>Ralph</a:t>
             </a:r>
-            <a:endParaRPr lang="en-US" dirty="0"/>
+          </a:p>
+          <a:p>
+            <a:pPr lvl="1"/>
+            <a:r>
+              <a:rPr lang="en-US" dirty="0" smtClean="0"/>
+              <a:t>C# creating </a:t>
+            </a:r>
+            <a:r>
+              <a:rPr lang="en-US" dirty="0" err="1" smtClean="0"/>
+              <a:t>ui</a:t>
+            </a:r>
+            <a:r>
+              <a:rPr lang="en-US" dirty="0" smtClean="0"/>
+              <a:t> controls</a:t>
+            </a:r>
+          </a:p>
+          <a:p>
+            <a:pPr lvl="1"/>
+            <a:r>
+              <a:rPr lang="en-US" dirty="0" smtClean="0"/>
+              <a:t>How to work with another team</a:t>
+            </a:r>
+          </a:p>
+          <a:p>
+            <a:pPr lvl="1"/>
+            <a:r>
+              <a:rPr lang="en-US" dirty="0" smtClean="0"/>
+              <a:t>Read documentation thoroughly</a:t>
+            </a:r>
+          </a:p>
+          <a:p>
+            <a:pPr lvl="1"/>
+            <a:endParaRPr lang="en-US" dirty="0" smtClean="0"/>
+          </a:p>
+          <a:p>
+            <a:pPr lvl="1"/>
+            <a:endParaRPr lang="en-US" dirty="0" smtClean="0"/>
+          </a:p>
+          <a:p>
+            <a:pPr lvl="1"/>
+            <a:endParaRPr lang="en-US" dirty="0" smtClean="0"/>
+          </a:p>
+          <a:p>
+            <a:pPr lvl="1"/>
+            <a:endParaRPr lang="en-US" dirty="0" smtClean="0"/>
           </a:p>
         </p:txBody>
       </p:sp>
@@ -4916,22 +4976,14 @@
           <a:p>
             <a:r>
               <a:rPr lang="en-US" dirty="0" smtClean="0"/>
-              <a:t>Data is collected on paper </a:t>
-            </a:r>
-            <a:r>
-              <a:rPr lang="en-US" dirty="0" smtClean="0"/>
-              <a:t>forms submitted via mail</a:t>
+              <a:t>Data is collected on paper forms submitted via mail</a:t>
             </a:r>
           </a:p>
           <a:p>
             <a:pPr lvl="1"/>
             <a:r>
               <a:rPr lang="en-US" dirty="0" smtClean="0"/>
-              <a:t>Potential for </a:t>
-            </a:r>
-            <a:r>
-              <a:rPr lang="en-US" dirty="0" smtClean="0"/>
-              <a:t>loss</a:t>
+              <a:t>Potential for loss</a:t>
             </a:r>
           </a:p>
           <a:p>
@@ -4940,19 +4992,13 @@
               <a:rPr lang="en-US" dirty="0" smtClean="0"/>
               <a:t>Errors during the collection of the data</a:t>
             </a:r>
-            <a:endParaRPr lang="en-US" dirty="0" smtClean="0"/>
           </a:p>
           <a:p>
             <a:pPr lvl="1"/>
             <a:r>
               <a:rPr lang="en-US" dirty="0" smtClean="0"/>
-              <a:t>Errors during </a:t>
-            </a:r>
-            <a:r>
-              <a:rPr lang="en-US" dirty="0" smtClean="0"/>
-              <a:t>transcription to Excel</a:t>
-            </a:r>
-            <a:endParaRPr lang="en-US" dirty="0" smtClean="0"/>
+              <a:t>Errors during transcription to Excel</a:t>
+            </a:r>
           </a:p>
           <a:p>
             <a:pPr lvl="1"/>
@@ -5120,7 +5166,7 @@
         <p:spPr/>
         <p:txBody>
           <a:bodyPr>
-            <a:normAutofit lnSpcReduction="10000"/>
+            <a:normAutofit/>
           </a:bodyPr>
           <a:lstStyle/>
           <a:p>
@@ -5140,13 +5186,8 @@
             <a:pPr lvl="1"/>
             <a:r>
               <a:rPr lang="en-US" dirty="0" smtClean="0"/>
-              <a:t>Raw </a:t>
-            </a:r>
-            <a:r>
-              <a:rPr lang="en-US" dirty="0" smtClean="0"/>
-              <a:t>Fish </a:t>
-            </a:r>
-            <a:endParaRPr lang="en-US" dirty="0" smtClean="0"/>
+              <a:t>Raw Fish </a:t>
+            </a:r>
           </a:p>
           <a:p>
             <a:pPr lvl="1"/>
@@ -5171,13 +5212,8 @@
           <a:p>
             <a:r>
               <a:rPr lang="en-US" dirty="0" smtClean="0"/>
-              <a:t>Fully functional with </a:t>
-            </a:r>
-            <a:r>
-              <a:rPr lang="en-US" dirty="0" smtClean="0"/>
-              <a:t>Team 4’s database</a:t>
-            </a:r>
-            <a:endParaRPr lang="en-US" dirty="0" smtClean="0"/>
+              <a:t>Fully functional with Team 4’s database</a:t>
+            </a:r>
           </a:p>
           <a:p>
             <a:r>
@@ -5405,13 +5441,8 @@
             <a:pPr lvl="1"/>
             <a:r>
               <a:rPr lang="en-US" dirty="0" smtClean="0"/>
-              <a:t>Windows 7 Professional (64 bit</a:t>
-            </a:r>
-            <a:r>
-              <a:rPr lang="en-US" dirty="0" smtClean="0"/>
-              <a:t>)</a:t>
-            </a:r>
-            <a:endParaRPr lang="en-US" dirty="0" smtClean="0"/>
+              <a:t>Windows 7 Professional (64 bit)</a:t>
+            </a:r>
           </a:p>
         </p:txBody>
       </p:sp>

</xml_diff>